<commit_message>
修正原版中的 \nUsing OpenCL Device ” 的错误
https://github.com/Kivy-CN/HandsOnOpenCL_CN/issues/1
</commit_message>
<xml_diff>
--- a/Translated/章节5.pptx
+++ b/Translated/章节5.pptx
@@ -123,6 +123,11 @@
       </a:defRPr>
     </a:lvl9pPr>
   </p:defaultTextStyle>
+  <p:extLst>
+    <p:ext uri="{EFAFB233-063F-42B5-8137-9DF3F51BA10A}">
+      <p15:sldGuideLst xmlns:p15="http://schemas.microsoft.com/office/powerpoint/2012/main"/>
+    </p:ext>
+  </p:extLst>
 </p:presentation>
 </file>
 
@@ -208,7 +213,7 @@
           <a:p>
             <a:fld id="{0A99A0C8-E96E-405A-A102-5398CAF98E9D}" type="datetimeFigureOut">
               <a:rPr lang="zh-CN" altLang="en-US" smtClean="0"/>
-              <a:t>2019/8/3</a:t>
+              <a:t>2019/9/15</a:t>
             </a:fld>
             <a:endParaRPr lang="zh-CN" altLang="en-US"/>
           </a:p>
@@ -1272,7 +1277,7 @@
           <a:p>
             <a:fld id="{223474E8-B119-47EE-8BFE-3819462EE539}" type="datetimeFigureOut">
               <a:rPr lang="zh-CN" altLang="en-US" smtClean="0"/>
-              <a:t>2019/8/3</a:t>
+              <a:t>2019/9/15</a:t>
             </a:fld>
             <a:endParaRPr lang="zh-CN" altLang="en-US"/>
           </a:p>
@@ -1470,7 +1475,7 @@
           <a:p>
             <a:fld id="{223474E8-B119-47EE-8BFE-3819462EE539}" type="datetimeFigureOut">
               <a:rPr lang="zh-CN" altLang="en-US" smtClean="0"/>
-              <a:t>2019/8/3</a:t>
+              <a:t>2019/9/15</a:t>
             </a:fld>
             <a:endParaRPr lang="zh-CN" altLang="en-US"/>
           </a:p>
@@ -1678,7 +1683,7 @@
           <a:p>
             <a:fld id="{223474E8-B119-47EE-8BFE-3819462EE539}" type="datetimeFigureOut">
               <a:rPr lang="zh-CN" altLang="en-US" smtClean="0"/>
-              <a:t>2019/8/3</a:t>
+              <a:t>2019/9/15</a:t>
             </a:fld>
             <a:endParaRPr lang="zh-CN" altLang="en-US"/>
           </a:p>
@@ -1876,7 +1881,7 @@
           <a:p>
             <a:fld id="{223474E8-B119-47EE-8BFE-3819462EE539}" type="datetimeFigureOut">
               <a:rPr lang="zh-CN" altLang="en-US" smtClean="0"/>
-              <a:t>2019/8/3</a:t>
+              <a:t>2019/9/15</a:t>
             </a:fld>
             <a:endParaRPr lang="zh-CN" altLang="en-US"/>
           </a:p>
@@ -2151,7 +2156,7 @@
           <a:p>
             <a:fld id="{223474E8-B119-47EE-8BFE-3819462EE539}" type="datetimeFigureOut">
               <a:rPr lang="zh-CN" altLang="en-US" smtClean="0"/>
-              <a:t>2019/8/3</a:t>
+              <a:t>2019/9/15</a:t>
             </a:fld>
             <a:endParaRPr lang="zh-CN" altLang="en-US"/>
           </a:p>
@@ -2416,7 +2421,7 @@
           <a:p>
             <a:fld id="{223474E8-B119-47EE-8BFE-3819462EE539}" type="datetimeFigureOut">
               <a:rPr lang="zh-CN" altLang="en-US" smtClean="0"/>
-              <a:t>2019/8/3</a:t>
+              <a:t>2019/9/15</a:t>
             </a:fld>
             <a:endParaRPr lang="zh-CN" altLang="en-US"/>
           </a:p>
@@ -2828,7 +2833,7 @@
           <a:p>
             <a:fld id="{223474E8-B119-47EE-8BFE-3819462EE539}" type="datetimeFigureOut">
               <a:rPr lang="zh-CN" altLang="en-US" smtClean="0"/>
-              <a:t>2019/8/3</a:t>
+              <a:t>2019/9/15</a:t>
             </a:fld>
             <a:endParaRPr lang="zh-CN" altLang="en-US"/>
           </a:p>
@@ -2969,7 +2974,7 @@
           <a:p>
             <a:fld id="{223474E8-B119-47EE-8BFE-3819462EE539}" type="datetimeFigureOut">
               <a:rPr lang="zh-CN" altLang="en-US" smtClean="0"/>
-              <a:t>2019/8/3</a:t>
+              <a:t>2019/9/15</a:t>
             </a:fld>
             <a:endParaRPr lang="zh-CN" altLang="en-US"/>
           </a:p>
@@ -3082,7 +3087,7 @@
           <a:p>
             <a:fld id="{223474E8-B119-47EE-8BFE-3819462EE539}" type="datetimeFigureOut">
               <a:rPr lang="zh-CN" altLang="en-US" smtClean="0"/>
-              <a:t>2019/8/3</a:t>
+              <a:t>2019/9/15</a:t>
             </a:fld>
             <a:endParaRPr lang="zh-CN" altLang="en-US"/>
           </a:p>
@@ -3393,7 +3398,7 @@
           <a:p>
             <a:fld id="{223474E8-B119-47EE-8BFE-3819462EE539}" type="datetimeFigureOut">
               <a:rPr lang="zh-CN" altLang="en-US" smtClean="0"/>
-              <a:t>2019/8/3</a:t>
+              <a:t>2019/9/15</a:t>
             </a:fld>
             <a:endParaRPr lang="zh-CN" altLang="en-US"/>
           </a:p>
@@ -3681,7 +3686,7 @@
           <a:p>
             <a:fld id="{223474E8-B119-47EE-8BFE-3819462EE539}" type="datetimeFigureOut">
               <a:rPr lang="zh-CN" altLang="en-US" smtClean="0"/>
-              <a:t>2019/8/3</a:t>
+              <a:t>2019/9/15</a:t>
             </a:fld>
             <a:endParaRPr lang="zh-CN" altLang="en-US"/>
           </a:p>
@@ -3922,7 +3927,7 @@
           <a:p>
             <a:fld id="{223474E8-B119-47EE-8BFE-3819462EE539}" type="datetimeFigureOut">
               <a:rPr lang="zh-CN" altLang="en-US" smtClean="0"/>
-              <a:t>2019/8/3</a:t>
+              <a:t>2019/9/15</a:t>
             </a:fld>
             <a:endParaRPr lang="zh-CN" altLang="en-US"/>
           </a:p>
@@ -9072,16 +9077,56 @@
               </a:lnSpc>
             </a:pPr>
             <a:r>
-              <a:rPr lang="en-US" sz="1100" b="1" spc="-1">
-                <a:solidFill>
-                  <a:srgbClr val="000000"/>
-                </a:solidFill>
-                <a:latin typeface="Courier New Bold"/>
-                <a:ea typeface="DejaVu Sans"/>
-              </a:rPr>
-              <a:t>int main(int argc, char *argv[])</a:t>
-            </a:r>
-            <a:endParaRPr lang="en-US" sz="1100" spc="-1">
+              <a:rPr lang="en-US" sz="1100" b="1" spc="-1" dirty="0">
+                <a:solidFill>
+                  <a:srgbClr val="000000"/>
+                </a:solidFill>
+                <a:latin typeface="Courier New Bold"/>
+                <a:ea typeface="DejaVu Sans"/>
+              </a:rPr>
+              <a:t>int main(int </a:t>
+            </a:r>
+            <a:r>
+              <a:rPr lang="en-US" sz="1100" b="1" spc="-1" dirty="0" err="1">
+                <a:solidFill>
+                  <a:srgbClr val="000000"/>
+                </a:solidFill>
+                <a:latin typeface="Courier New Bold"/>
+                <a:ea typeface="DejaVu Sans"/>
+              </a:rPr>
+              <a:t>argc</a:t>
+            </a:r>
+            <a:r>
+              <a:rPr lang="en-US" sz="1100" b="1" spc="-1" dirty="0">
+                <a:solidFill>
+                  <a:srgbClr val="000000"/>
+                </a:solidFill>
+                <a:latin typeface="Courier New Bold"/>
+                <a:ea typeface="DejaVu Sans"/>
+              </a:rPr>
+              <a:t>, char *</a:t>
+            </a:r>
+            <a:r>
+              <a:rPr lang="en-US" sz="1100" b="1" spc="-1" dirty="0" err="1">
+                <a:solidFill>
+                  <a:srgbClr val="000000"/>
+                </a:solidFill>
+                <a:latin typeface="Courier New Bold"/>
+                <a:ea typeface="DejaVu Sans"/>
+              </a:rPr>
+              <a:t>argv</a:t>
+            </a:r>
+            <a:r>
+              <a:rPr lang="en-US" sz="1100" b="1" spc="-1" dirty="0">
+                <a:solidFill>
+                  <a:srgbClr val="000000"/>
+                </a:solidFill>
+                <a:latin typeface="Courier New Bold"/>
+                <a:ea typeface="DejaVu Sans"/>
+              </a:rPr>
+              <a:t>[])</a:t>
+            </a:r>
+            <a:endParaRPr lang="en-US" sz="1100" spc="-1" dirty="0">
               <a:latin typeface="Arial"/>
             </a:endParaRPr>
           </a:p>
@@ -9092,7 +9137,7 @@
               </a:lnSpc>
             </a:pPr>
             <a:r>
-              <a:rPr lang="en-US" sz="1100" b="1" spc="-1">
+              <a:rPr lang="en-US" sz="1100" b="1" spc="-1" dirty="0">
                 <a:solidFill>
                   <a:srgbClr val="000000"/>
                 </a:solidFill>
@@ -9101,7 +9146,7 @@
               </a:rPr>
               <a:t>{</a:t>
             </a:r>
-            <a:endParaRPr lang="en-US" sz="1100" spc="-1">
+            <a:endParaRPr lang="en-US" sz="1100" spc="-1" dirty="0">
               <a:latin typeface="Arial"/>
             </a:endParaRPr>
           </a:p>
@@ -9112,16 +9157,76 @@
               </a:lnSpc>
             </a:pPr>
             <a:r>
-              <a:rPr lang="en-US" sz="1100" b="1" spc="-1">
-                <a:solidFill>
-                  <a:srgbClr val="000000"/>
-                </a:solidFill>
-                <a:latin typeface="Courier New Bold"/>
-                <a:ea typeface="DejaVu Sans"/>
-              </a:rPr>
-              <a:t>  std::vector&lt;float&gt; h_A, h_B, h_C; // matrices</a:t>
-            </a:r>
-            <a:endParaRPr lang="en-US" sz="1100" spc="-1">
+              <a:rPr lang="en-US" sz="1100" b="1" spc="-1" dirty="0">
+                <a:solidFill>
+                  <a:srgbClr val="000000"/>
+                </a:solidFill>
+                <a:latin typeface="Courier New Bold"/>
+                <a:ea typeface="DejaVu Sans"/>
+              </a:rPr>
+              <a:t>  std::vector&lt;float&gt; </a:t>
+            </a:r>
+            <a:r>
+              <a:rPr lang="en-US" sz="1100" b="1" spc="-1" dirty="0" err="1">
+                <a:solidFill>
+                  <a:srgbClr val="000000"/>
+                </a:solidFill>
+                <a:latin typeface="Courier New Bold"/>
+                <a:ea typeface="DejaVu Sans"/>
+              </a:rPr>
+              <a:t>h_A</a:t>
+            </a:r>
+            <a:r>
+              <a:rPr lang="en-US" sz="1100" b="1" spc="-1" dirty="0">
+                <a:solidFill>
+                  <a:srgbClr val="000000"/>
+                </a:solidFill>
+                <a:latin typeface="Courier New Bold"/>
+                <a:ea typeface="DejaVu Sans"/>
+              </a:rPr>
+              <a:t>, </a:t>
+            </a:r>
+            <a:r>
+              <a:rPr lang="en-US" sz="1100" b="1" spc="-1" dirty="0" err="1">
+                <a:solidFill>
+                  <a:srgbClr val="000000"/>
+                </a:solidFill>
+                <a:latin typeface="Courier New Bold"/>
+                <a:ea typeface="DejaVu Sans"/>
+              </a:rPr>
+              <a:t>h_B</a:t>
+            </a:r>
+            <a:r>
+              <a:rPr lang="en-US" sz="1100" b="1" spc="-1" dirty="0">
+                <a:solidFill>
+                  <a:srgbClr val="000000"/>
+                </a:solidFill>
+                <a:latin typeface="Courier New Bold"/>
+                <a:ea typeface="DejaVu Sans"/>
+              </a:rPr>
+              <a:t>, </a:t>
+            </a:r>
+            <a:r>
+              <a:rPr lang="en-US" sz="1100" b="1" spc="-1" dirty="0" err="1">
+                <a:solidFill>
+                  <a:srgbClr val="000000"/>
+                </a:solidFill>
+                <a:latin typeface="Courier New Bold"/>
+                <a:ea typeface="DejaVu Sans"/>
+              </a:rPr>
+              <a:t>h_C</a:t>
+            </a:r>
+            <a:r>
+              <a:rPr lang="en-US" sz="1100" b="1" spc="-1" dirty="0">
+                <a:solidFill>
+                  <a:srgbClr val="000000"/>
+                </a:solidFill>
+                <a:latin typeface="Courier New Bold"/>
+                <a:ea typeface="DejaVu Sans"/>
+              </a:rPr>
+              <a:t>; // matrices</a:t>
+            </a:r>
+            <a:endParaRPr lang="en-US" sz="1100" spc="-1" dirty="0">
               <a:latin typeface="Arial"/>
             </a:endParaRPr>
           </a:p>
@@ -9132,16 +9237,76 @@
               </a:lnSpc>
             </a:pPr>
             <a:r>
-              <a:rPr lang="en-US" sz="1100" b="1" spc="-1">
-                <a:solidFill>
-                  <a:srgbClr val="000000"/>
-                </a:solidFill>
-                <a:latin typeface="Courier New Bold"/>
-                <a:ea typeface="DejaVu Sans"/>
-              </a:rPr>
-              <a:t>  int Mdim, Ndim, Pdim; // A[N][P],B[P][M],C[N][M]</a:t>
-            </a:r>
-            <a:endParaRPr lang="en-US" sz="1100" spc="-1">
+              <a:rPr lang="en-US" sz="1100" b="1" spc="-1" dirty="0">
+                <a:solidFill>
+                  <a:srgbClr val="000000"/>
+                </a:solidFill>
+                <a:latin typeface="Courier New Bold"/>
+                <a:ea typeface="DejaVu Sans"/>
+              </a:rPr>
+              <a:t>  int </a:t>
+            </a:r>
+            <a:r>
+              <a:rPr lang="en-US" sz="1100" b="1" spc="-1" dirty="0" err="1">
+                <a:solidFill>
+                  <a:srgbClr val="000000"/>
+                </a:solidFill>
+                <a:latin typeface="Courier New Bold"/>
+                <a:ea typeface="DejaVu Sans"/>
+              </a:rPr>
+              <a:t>Mdim</a:t>
+            </a:r>
+            <a:r>
+              <a:rPr lang="en-US" sz="1100" b="1" spc="-1" dirty="0">
+                <a:solidFill>
+                  <a:srgbClr val="000000"/>
+                </a:solidFill>
+                <a:latin typeface="Courier New Bold"/>
+                <a:ea typeface="DejaVu Sans"/>
+              </a:rPr>
+              <a:t>, </a:t>
+            </a:r>
+            <a:r>
+              <a:rPr lang="en-US" sz="1100" b="1" spc="-1" dirty="0" err="1">
+                <a:solidFill>
+                  <a:srgbClr val="000000"/>
+                </a:solidFill>
+                <a:latin typeface="Courier New Bold"/>
+                <a:ea typeface="DejaVu Sans"/>
+              </a:rPr>
+              <a:t>Ndim</a:t>
+            </a:r>
+            <a:r>
+              <a:rPr lang="en-US" sz="1100" b="1" spc="-1" dirty="0">
+                <a:solidFill>
+                  <a:srgbClr val="000000"/>
+                </a:solidFill>
+                <a:latin typeface="Courier New Bold"/>
+                <a:ea typeface="DejaVu Sans"/>
+              </a:rPr>
+              <a:t>, </a:t>
+            </a:r>
+            <a:r>
+              <a:rPr lang="en-US" sz="1100" b="1" spc="-1" dirty="0" err="1">
+                <a:solidFill>
+                  <a:srgbClr val="000000"/>
+                </a:solidFill>
+                <a:latin typeface="Courier New Bold"/>
+                <a:ea typeface="DejaVu Sans"/>
+              </a:rPr>
+              <a:t>Pdim</a:t>
+            </a:r>
+            <a:r>
+              <a:rPr lang="en-US" sz="1100" b="1" spc="-1" dirty="0">
+                <a:solidFill>
+                  <a:srgbClr val="000000"/>
+                </a:solidFill>
+                <a:latin typeface="Courier New Bold"/>
+                <a:ea typeface="DejaVu Sans"/>
+              </a:rPr>
+              <a:t>; // A[N][P],B[P][M],C[N][M]</a:t>
+            </a:r>
+            <a:endParaRPr lang="en-US" sz="1100" spc="-1" dirty="0">
               <a:latin typeface="Arial"/>
             </a:endParaRPr>
           </a:p>
@@ -9152,16 +9317,36 @@
               </a:lnSpc>
             </a:pPr>
             <a:r>
-              <a:rPr lang="en-US" sz="1100" b="1" spc="-1">
-                <a:solidFill>
-                  <a:srgbClr val="000000"/>
-                </a:solidFill>
-                <a:latin typeface="Courier New Bold"/>
-                <a:ea typeface="DejaVu Sans"/>
-              </a:rPr>
-              <a:t>  int i, err; </a:t>
-            </a:r>
-            <a:endParaRPr lang="en-US" sz="1100" spc="-1">
+              <a:rPr lang="en-US" sz="1100" b="1" spc="-1" dirty="0">
+                <a:solidFill>
+                  <a:srgbClr val="000000"/>
+                </a:solidFill>
+                <a:latin typeface="Courier New Bold"/>
+                <a:ea typeface="DejaVu Sans"/>
+              </a:rPr>
+              <a:t>  int </a:t>
+            </a:r>
+            <a:r>
+              <a:rPr lang="en-US" sz="1100" b="1" spc="-1" dirty="0" err="1">
+                <a:solidFill>
+                  <a:srgbClr val="000000"/>
+                </a:solidFill>
+                <a:latin typeface="Courier New Bold"/>
+                <a:ea typeface="DejaVu Sans"/>
+              </a:rPr>
+              <a:t>i</a:t>
+            </a:r>
+            <a:r>
+              <a:rPr lang="en-US" sz="1100" b="1" spc="-1" dirty="0">
+                <a:solidFill>
+                  <a:srgbClr val="000000"/>
+                </a:solidFill>
+                <a:latin typeface="Courier New Bold"/>
+                <a:ea typeface="DejaVu Sans"/>
+              </a:rPr>
+              <a:t>, err; </a:t>
+            </a:r>
+            <a:endParaRPr lang="en-US" sz="1100" spc="-1" dirty="0">
               <a:latin typeface="Arial"/>
             </a:endParaRPr>
           </a:p>
@@ -9172,16 +9357,76 @@
               </a:lnSpc>
             </a:pPr>
             <a:r>
-              <a:rPr lang="en-US" sz="1100" b="1" spc="-1">
-                <a:solidFill>
-                  <a:srgbClr val="000000"/>
-                </a:solidFill>
-                <a:latin typeface="Courier New Bold"/>
-                <a:ea typeface="DejaVu Sans"/>
-              </a:rPr>
-              <a:t>  int szA, szB, szC; // num elements in each matrix</a:t>
-            </a:r>
-            <a:endParaRPr lang="en-US" sz="1100" spc="-1">
+              <a:rPr lang="en-US" sz="1100" b="1" spc="-1" dirty="0">
+                <a:solidFill>
+                  <a:srgbClr val="000000"/>
+                </a:solidFill>
+                <a:latin typeface="Courier New Bold"/>
+                <a:ea typeface="DejaVu Sans"/>
+              </a:rPr>
+              <a:t>  int </a:t>
+            </a:r>
+            <a:r>
+              <a:rPr lang="en-US" sz="1100" b="1" spc="-1" dirty="0" err="1">
+                <a:solidFill>
+                  <a:srgbClr val="000000"/>
+                </a:solidFill>
+                <a:latin typeface="Courier New Bold"/>
+                <a:ea typeface="DejaVu Sans"/>
+              </a:rPr>
+              <a:t>szA</a:t>
+            </a:r>
+            <a:r>
+              <a:rPr lang="en-US" sz="1100" b="1" spc="-1" dirty="0">
+                <a:solidFill>
+                  <a:srgbClr val="000000"/>
+                </a:solidFill>
+                <a:latin typeface="Courier New Bold"/>
+                <a:ea typeface="DejaVu Sans"/>
+              </a:rPr>
+              <a:t>, </a:t>
+            </a:r>
+            <a:r>
+              <a:rPr lang="en-US" sz="1100" b="1" spc="-1" dirty="0" err="1">
+                <a:solidFill>
+                  <a:srgbClr val="000000"/>
+                </a:solidFill>
+                <a:latin typeface="Courier New Bold"/>
+                <a:ea typeface="DejaVu Sans"/>
+              </a:rPr>
+              <a:t>szB</a:t>
+            </a:r>
+            <a:r>
+              <a:rPr lang="en-US" sz="1100" b="1" spc="-1" dirty="0">
+                <a:solidFill>
+                  <a:srgbClr val="000000"/>
+                </a:solidFill>
+                <a:latin typeface="Courier New Bold"/>
+                <a:ea typeface="DejaVu Sans"/>
+              </a:rPr>
+              <a:t>, </a:t>
+            </a:r>
+            <a:r>
+              <a:rPr lang="en-US" sz="1100" b="1" spc="-1" dirty="0" err="1">
+                <a:solidFill>
+                  <a:srgbClr val="000000"/>
+                </a:solidFill>
+                <a:latin typeface="Courier New Bold"/>
+                <a:ea typeface="DejaVu Sans"/>
+              </a:rPr>
+              <a:t>szC</a:t>
+            </a:r>
+            <a:r>
+              <a:rPr lang="en-US" sz="1100" b="1" spc="-1" dirty="0">
+                <a:solidFill>
+                  <a:srgbClr val="000000"/>
+                </a:solidFill>
+                <a:latin typeface="Courier New Bold"/>
+                <a:ea typeface="DejaVu Sans"/>
+              </a:rPr>
+              <a:t>; // num elements in each matrix</a:t>
+            </a:r>
+            <a:endParaRPr lang="en-US" sz="1100" spc="-1" dirty="0">
               <a:latin typeface="Arial"/>
             </a:endParaRPr>
           </a:p>
@@ -9192,16 +9437,56 @@
               </a:lnSpc>
             </a:pPr>
             <a:r>
-              <a:rPr lang="en-US" sz="1100" b="1" spc="-1">
-                <a:solidFill>
-                  <a:srgbClr val="000000"/>
-                </a:solidFill>
-                <a:latin typeface="Courier New Bold"/>
-                <a:ea typeface="DejaVu Sans"/>
-              </a:rPr>
-              <a:t>  double start_time, run_time; // timing data</a:t>
-            </a:r>
-            <a:endParaRPr lang="en-US" sz="1100" spc="-1">
+              <a:rPr lang="en-US" sz="1100" b="1" spc="-1" dirty="0">
+                <a:solidFill>
+                  <a:srgbClr val="000000"/>
+                </a:solidFill>
+                <a:latin typeface="Courier New Bold"/>
+                <a:ea typeface="DejaVu Sans"/>
+              </a:rPr>
+              <a:t>  double </a:t>
+            </a:r>
+            <a:r>
+              <a:rPr lang="en-US" sz="1100" b="1" spc="-1" dirty="0" err="1">
+                <a:solidFill>
+                  <a:srgbClr val="000000"/>
+                </a:solidFill>
+                <a:latin typeface="Courier New Bold"/>
+                <a:ea typeface="DejaVu Sans"/>
+              </a:rPr>
+              <a:t>start_time</a:t>
+            </a:r>
+            <a:r>
+              <a:rPr lang="en-US" sz="1100" b="1" spc="-1" dirty="0">
+                <a:solidFill>
+                  <a:srgbClr val="000000"/>
+                </a:solidFill>
+                <a:latin typeface="Courier New Bold"/>
+                <a:ea typeface="DejaVu Sans"/>
+              </a:rPr>
+              <a:t>, </a:t>
+            </a:r>
+            <a:r>
+              <a:rPr lang="en-US" sz="1100" b="1" spc="-1" dirty="0" err="1">
+                <a:solidFill>
+                  <a:srgbClr val="000000"/>
+                </a:solidFill>
+                <a:latin typeface="Courier New Bold"/>
+                <a:ea typeface="DejaVu Sans"/>
+              </a:rPr>
+              <a:t>run_time</a:t>
+            </a:r>
+            <a:r>
+              <a:rPr lang="en-US" sz="1100" b="1" spc="-1" dirty="0">
+                <a:solidFill>
+                  <a:srgbClr val="000000"/>
+                </a:solidFill>
+                <a:latin typeface="Courier New Bold"/>
+                <a:ea typeface="DejaVu Sans"/>
+              </a:rPr>
+              <a:t>; // timing data</a:t>
+            </a:r>
+            <a:endParaRPr lang="en-US" sz="1100" spc="-1" dirty="0">
               <a:latin typeface="Arial"/>
             </a:endParaRPr>
           </a:p>
@@ -9212,16 +9497,36 @@
               </a:lnSpc>
             </a:pPr>
             <a:r>
-              <a:rPr lang="en-US" sz="1100" b="1" spc="-1">
-                <a:solidFill>
-                  <a:srgbClr val="000000"/>
-                </a:solidFill>
-                <a:latin typeface="Courier New Bold"/>
-                <a:ea typeface="DejaVu Sans"/>
-              </a:rPr>
-              <a:t>  cl::Program program;</a:t>
-            </a:r>
-            <a:endParaRPr lang="en-US" sz="1100" spc="-1">
+              <a:rPr lang="en-US" sz="1100" b="1" spc="-1" dirty="0">
+                <a:solidFill>
+                  <a:srgbClr val="000000"/>
+                </a:solidFill>
+                <a:latin typeface="Courier New Bold"/>
+                <a:ea typeface="DejaVu Sans"/>
+              </a:rPr>
+              <a:t>  cl::Program </a:t>
+            </a:r>
+            <a:r>
+              <a:rPr lang="en-US" sz="1100" b="1" spc="-1" dirty="0" err="1">
+                <a:solidFill>
+                  <a:srgbClr val="000000"/>
+                </a:solidFill>
+                <a:latin typeface="Courier New Bold"/>
+                <a:ea typeface="DejaVu Sans"/>
+              </a:rPr>
+              <a:t>program</a:t>
+            </a:r>
+            <a:r>
+              <a:rPr lang="en-US" sz="1100" b="1" spc="-1" dirty="0">
+                <a:solidFill>
+                  <a:srgbClr val="000000"/>
+                </a:solidFill>
+                <a:latin typeface="Courier New Bold"/>
+                <a:ea typeface="DejaVu Sans"/>
+              </a:rPr>
+              <a:t>;</a:t>
+            </a:r>
+            <a:endParaRPr lang="en-US" sz="1100" spc="-1" dirty="0">
               <a:latin typeface="Arial"/>
             </a:endParaRPr>
           </a:p>
@@ -9231,7 +9536,7 @@
                 <a:spcPct val="100000"/>
               </a:lnSpc>
             </a:pPr>
-            <a:endParaRPr lang="en-US" sz="1100" spc="-1">
+            <a:endParaRPr lang="en-US" sz="1100" spc="-1" dirty="0">
               <a:latin typeface="Arial"/>
             </a:endParaRPr>
           </a:p>
@@ -9242,16 +9547,76 @@
               </a:lnSpc>
             </a:pPr>
             <a:r>
-              <a:rPr lang="en-US" sz="1100" b="1" spc="-1">
-                <a:solidFill>
-                  <a:srgbClr val="000000"/>
-                </a:solidFill>
-                <a:latin typeface="Courier New Bold"/>
-                <a:ea typeface="DejaVu Sans"/>
-              </a:rPr>
-              <a:t>  Ndim = Pdim = Mdim = ORDER;</a:t>
-            </a:r>
-            <a:endParaRPr lang="en-US" sz="1100" spc="-1">
+              <a:rPr lang="en-US" sz="1100" b="1" spc="-1" dirty="0">
+                <a:solidFill>
+                  <a:srgbClr val="000000"/>
+                </a:solidFill>
+                <a:latin typeface="Courier New Bold"/>
+                <a:ea typeface="DejaVu Sans"/>
+              </a:rPr>
+              <a:t>  </a:t>
+            </a:r>
+            <a:r>
+              <a:rPr lang="en-US" sz="1100" b="1" spc="-1" dirty="0" err="1">
+                <a:solidFill>
+                  <a:srgbClr val="000000"/>
+                </a:solidFill>
+                <a:latin typeface="Courier New Bold"/>
+                <a:ea typeface="DejaVu Sans"/>
+              </a:rPr>
+              <a:t>Ndim</a:t>
+            </a:r>
+            <a:r>
+              <a:rPr lang="en-US" sz="1100" b="1" spc="-1" dirty="0">
+                <a:solidFill>
+                  <a:srgbClr val="000000"/>
+                </a:solidFill>
+                <a:latin typeface="Courier New Bold"/>
+                <a:ea typeface="DejaVu Sans"/>
+              </a:rPr>
+              <a:t> = </a:t>
+            </a:r>
+            <a:r>
+              <a:rPr lang="en-US" sz="1100" b="1" spc="-1" dirty="0" err="1">
+                <a:solidFill>
+                  <a:srgbClr val="000000"/>
+                </a:solidFill>
+                <a:latin typeface="Courier New Bold"/>
+                <a:ea typeface="DejaVu Sans"/>
+              </a:rPr>
+              <a:t>Pdim</a:t>
+            </a:r>
+            <a:r>
+              <a:rPr lang="en-US" sz="1100" b="1" spc="-1" dirty="0">
+                <a:solidFill>
+                  <a:srgbClr val="000000"/>
+                </a:solidFill>
+                <a:latin typeface="Courier New Bold"/>
+                <a:ea typeface="DejaVu Sans"/>
+              </a:rPr>
+              <a:t> = </a:t>
+            </a:r>
+            <a:r>
+              <a:rPr lang="en-US" sz="1100" b="1" spc="-1" dirty="0" err="1">
+                <a:solidFill>
+                  <a:srgbClr val="000000"/>
+                </a:solidFill>
+                <a:latin typeface="Courier New Bold"/>
+                <a:ea typeface="DejaVu Sans"/>
+              </a:rPr>
+              <a:t>Mdim</a:t>
+            </a:r>
+            <a:r>
+              <a:rPr lang="en-US" sz="1100" b="1" spc="-1" dirty="0">
+                <a:solidFill>
+                  <a:srgbClr val="000000"/>
+                </a:solidFill>
+                <a:latin typeface="Courier New Bold"/>
+                <a:ea typeface="DejaVu Sans"/>
+              </a:rPr>
+              <a:t> = ORDER;</a:t>
+            </a:r>
+            <a:endParaRPr lang="en-US" sz="1100" spc="-1" dirty="0">
               <a:latin typeface="Arial"/>
             </a:endParaRPr>
           </a:p>
@@ -9262,16 +9627,76 @@
               </a:lnSpc>
             </a:pPr>
             <a:r>
-              <a:rPr lang="en-US" sz="1100" b="1" spc="-1">
-                <a:solidFill>
-                  <a:srgbClr val="000000"/>
-                </a:solidFill>
-                <a:latin typeface="Courier New Bold"/>
-                <a:ea typeface="DejaVu Sans"/>
-              </a:rPr>
-              <a:t>  szA = Ndim*Pdim; </a:t>
-            </a:r>
-            <a:endParaRPr lang="en-US" sz="1100" spc="-1">
+              <a:rPr lang="en-US" sz="1100" b="1" spc="-1" dirty="0">
+                <a:solidFill>
+                  <a:srgbClr val="000000"/>
+                </a:solidFill>
+                <a:latin typeface="Courier New Bold"/>
+                <a:ea typeface="DejaVu Sans"/>
+              </a:rPr>
+              <a:t>  </a:t>
+            </a:r>
+            <a:r>
+              <a:rPr lang="en-US" sz="1100" b="1" spc="-1" dirty="0" err="1">
+                <a:solidFill>
+                  <a:srgbClr val="000000"/>
+                </a:solidFill>
+                <a:latin typeface="Courier New Bold"/>
+                <a:ea typeface="DejaVu Sans"/>
+              </a:rPr>
+              <a:t>szA</a:t>
+            </a:r>
+            <a:r>
+              <a:rPr lang="en-US" sz="1100" b="1" spc="-1" dirty="0">
+                <a:solidFill>
+                  <a:srgbClr val="000000"/>
+                </a:solidFill>
+                <a:latin typeface="Courier New Bold"/>
+                <a:ea typeface="DejaVu Sans"/>
+              </a:rPr>
+              <a:t> = </a:t>
+            </a:r>
+            <a:r>
+              <a:rPr lang="en-US" sz="1100" b="1" spc="-1" dirty="0" err="1">
+                <a:solidFill>
+                  <a:srgbClr val="000000"/>
+                </a:solidFill>
+                <a:latin typeface="Courier New Bold"/>
+                <a:ea typeface="DejaVu Sans"/>
+              </a:rPr>
+              <a:t>Ndim</a:t>
+            </a:r>
+            <a:r>
+              <a:rPr lang="en-US" sz="1100" b="1" spc="-1" dirty="0">
+                <a:solidFill>
+                  <a:srgbClr val="000000"/>
+                </a:solidFill>
+                <a:latin typeface="Courier New Bold"/>
+                <a:ea typeface="DejaVu Sans"/>
+              </a:rPr>
+              <a:t>*</a:t>
+            </a:r>
+            <a:r>
+              <a:rPr lang="en-US" sz="1100" b="1" spc="-1" dirty="0" err="1">
+                <a:solidFill>
+                  <a:srgbClr val="000000"/>
+                </a:solidFill>
+                <a:latin typeface="Courier New Bold"/>
+                <a:ea typeface="DejaVu Sans"/>
+              </a:rPr>
+              <a:t>Pdim</a:t>
+            </a:r>
+            <a:r>
+              <a:rPr lang="en-US" sz="1100" b="1" spc="-1" dirty="0">
+                <a:solidFill>
+                  <a:srgbClr val="000000"/>
+                </a:solidFill>
+                <a:latin typeface="Courier New Bold"/>
+                <a:ea typeface="DejaVu Sans"/>
+              </a:rPr>
+              <a:t>; </a:t>
+            </a:r>
+            <a:endParaRPr lang="en-US" sz="1100" spc="-1" dirty="0">
               <a:latin typeface="Arial"/>
             </a:endParaRPr>
           </a:p>
@@ -9282,16 +9707,76 @@
               </a:lnSpc>
             </a:pPr>
             <a:r>
-              <a:rPr lang="en-US" sz="1100" b="1" spc="-1">
-                <a:solidFill>
-                  <a:srgbClr val="000000"/>
-                </a:solidFill>
-                <a:latin typeface="Courier New Bold"/>
-                <a:ea typeface="DejaVu Sans"/>
-              </a:rPr>
-              <a:t>  szB = Pdim*Mdim; </a:t>
-            </a:r>
-            <a:endParaRPr lang="en-US" sz="1100" spc="-1">
+              <a:rPr lang="en-US" sz="1100" b="1" spc="-1" dirty="0">
+                <a:solidFill>
+                  <a:srgbClr val="000000"/>
+                </a:solidFill>
+                <a:latin typeface="Courier New Bold"/>
+                <a:ea typeface="DejaVu Sans"/>
+              </a:rPr>
+              <a:t>  </a:t>
+            </a:r>
+            <a:r>
+              <a:rPr lang="en-US" sz="1100" b="1" spc="-1" dirty="0" err="1">
+                <a:solidFill>
+                  <a:srgbClr val="000000"/>
+                </a:solidFill>
+                <a:latin typeface="Courier New Bold"/>
+                <a:ea typeface="DejaVu Sans"/>
+              </a:rPr>
+              <a:t>szB</a:t>
+            </a:r>
+            <a:r>
+              <a:rPr lang="en-US" sz="1100" b="1" spc="-1" dirty="0">
+                <a:solidFill>
+                  <a:srgbClr val="000000"/>
+                </a:solidFill>
+                <a:latin typeface="Courier New Bold"/>
+                <a:ea typeface="DejaVu Sans"/>
+              </a:rPr>
+              <a:t> = </a:t>
+            </a:r>
+            <a:r>
+              <a:rPr lang="en-US" sz="1100" b="1" spc="-1" dirty="0" err="1">
+                <a:solidFill>
+                  <a:srgbClr val="000000"/>
+                </a:solidFill>
+                <a:latin typeface="Courier New Bold"/>
+                <a:ea typeface="DejaVu Sans"/>
+              </a:rPr>
+              <a:t>Pdim</a:t>
+            </a:r>
+            <a:r>
+              <a:rPr lang="en-US" sz="1100" b="1" spc="-1" dirty="0">
+                <a:solidFill>
+                  <a:srgbClr val="000000"/>
+                </a:solidFill>
+                <a:latin typeface="Courier New Bold"/>
+                <a:ea typeface="DejaVu Sans"/>
+              </a:rPr>
+              <a:t>*</a:t>
+            </a:r>
+            <a:r>
+              <a:rPr lang="en-US" sz="1100" b="1" spc="-1" dirty="0" err="1">
+                <a:solidFill>
+                  <a:srgbClr val="000000"/>
+                </a:solidFill>
+                <a:latin typeface="Courier New Bold"/>
+                <a:ea typeface="DejaVu Sans"/>
+              </a:rPr>
+              <a:t>Mdim</a:t>
+            </a:r>
+            <a:r>
+              <a:rPr lang="en-US" sz="1100" b="1" spc="-1" dirty="0">
+                <a:solidFill>
+                  <a:srgbClr val="000000"/>
+                </a:solidFill>
+                <a:latin typeface="Courier New Bold"/>
+                <a:ea typeface="DejaVu Sans"/>
+              </a:rPr>
+              <a:t>; </a:t>
+            </a:r>
+            <a:endParaRPr lang="en-US" sz="1100" spc="-1" dirty="0">
               <a:latin typeface="Arial"/>
             </a:endParaRPr>
           </a:p>
@@ -9302,16 +9787,76 @@
               </a:lnSpc>
             </a:pPr>
             <a:r>
-              <a:rPr lang="en-US" sz="1100" b="1" spc="-1">
-                <a:solidFill>
-                  <a:srgbClr val="000000"/>
-                </a:solidFill>
-                <a:latin typeface="Courier New Bold"/>
-                <a:ea typeface="DejaVu Sans"/>
-              </a:rPr>
-              <a:t>  szC = Ndim*Mdim;</a:t>
-            </a:r>
-            <a:endParaRPr lang="en-US" sz="1100" spc="-1">
+              <a:rPr lang="en-US" sz="1100" b="1" spc="-1" dirty="0">
+                <a:solidFill>
+                  <a:srgbClr val="000000"/>
+                </a:solidFill>
+                <a:latin typeface="Courier New Bold"/>
+                <a:ea typeface="DejaVu Sans"/>
+              </a:rPr>
+              <a:t>  </a:t>
+            </a:r>
+            <a:r>
+              <a:rPr lang="en-US" sz="1100" b="1" spc="-1" dirty="0" err="1">
+                <a:solidFill>
+                  <a:srgbClr val="000000"/>
+                </a:solidFill>
+                <a:latin typeface="Courier New Bold"/>
+                <a:ea typeface="DejaVu Sans"/>
+              </a:rPr>
+              <a:t>szC</a:t>
+            </a:r>
+            <a:r>
+              <a:rPr lang="en-US" sz="1100" b="1" spc="-1" dirty="0">
+                <a:solidFill>
+                  <a:srgbClr val="000000"/>
+                </a:solidFill>
+                <a:latin typeface="Courier New Bold"/>
+                <a:ea typeface="DejaVu Sans"/>
+              </a:rPr>
+              <a:t> = </a:t>
+            </a:r>
+            <a:r>
+              <a:rPr lang="en-US" sz="1100" b="1" spc="-1" dirty="0" err="1">
+                <a:solidFill>
+                  <a:srgbClr val="000000"/>
+                </a:solidFill>
+                <a:latin typeface="Courier New Bold"/>
+                <a:ea typeface="DejaVu Sans"/>
+              </a:rPr>
+              <a:t>Ndim</a:t>
+            </a:r>
+            <a:r>
+              <a:rPr lang="en-US" sz="1100" b="1" spc="-1" dirty="0">
+                <a:solidFill>
+                  <a:srgbClr val="000000"/>
+                </a:solidFill>
+                <a:latin typeface="Courier New Bold"/>
+                <a:ea typeface="DejaVu Sans"/>
+              </a:rPr>
+              <a:t>*</a:t>
+            </a:r>
+            <a:r>
+              <a:rPr lang="en-US" sz="1100" b="1" spc="-1" dirty="0" err="1">
+                <a:solidFill>
+                  <a:srgbClr val="000000"/>
+                </a:solidFill>
+                <a:latin typeface="Courier New Bold"/>
+                <a:ea typeface="DejaVu Sans"/>
+              </a:rPr>
+              <a:t>Mdim</a:t>
+            </a:r>
+            <a:r>
+              <a:rPr lang="en-US" sz="1100" b="1" spc="-1" dirty="0">
+                <a:solidFill>
+                  <a:srgbClr val="000000"/>
+                </a:solidFill>
+                <a:latin typeface="Courier New Bold"/>
+                <a:ea typeface="DejaVu Sans"/>
+              </a:rPr>
+              <a:t>;</a:t>
+            </a:r>
+            <a:endParaRPr lang="en-US" sz="1100" spc="-1" dirty="0">
               <a:latin typeface="Arial"/>
             </a:endParaRPr>
           </a:p>
@@ -9322,16 +9867,56 @@
               </a:lnSpc>
             </a:pPr>
             <a:r>
-              <a:rPr lang="en-US" sz="1100" b="1" spc="-1">
-                <a:solidFill>
-                  <a:srgbClr val="000000"/>
-                </a:solidFill>
-                <a:latin typeface="Courier New Bold"/>
-                <a:ea typeface="DejaVu Sans"/>
-              </a:rPr>
-              <a:t>  h_A   = std::vector&lt;float&gt;(szA);</a:t>
-            </a:r>
-            <a:endParaRPr lang="en-US" sz="1100" spc="-1">
+              <a:rPr lang="en-US" sz="1100" b="1" spc="-1" dirty="0">
+                <a:solidFill>
+                  <a:srgbClr val="000000"/>
+                </a:solidFill>
+                <a:latin typeface="Courier New Bold"/>
+                <a:ea typeface="DejaVu Sans"/>
+              </a:rPr>
+              <a:t>  </a:t>
+            </a:r>
+            <a:r>
+              <a:rPr lang="en-US" sz="1100" b="1" spc="-1" dirty="0" err="1">
+                <a:solidFill>
+                  <a:srgbClr val="000000"/>
+                </a:solidFill>
+                <a:latin typeface="Courier New Bold"/>
+                <a:ea typeface="DejaVu Sans"/>
+              </a:rPr>
+              <a:t>h_A</a:t>
+            </a:r>
+            <a:r>
+              <a:rPr lang="en-US" sz="1100" b="1" spc="-1" dirty="0">
+                <a:solidFill>
+                  <a:srgbClr val="000000"/>
+                </a:solidFill>
+                <a:latin typeface="Courier New Bold"/>
+                <a:ea typeface="DejaVu Sans"/>
+              </a:rPr>
+              <a:t>   = std::vector&lt;float&gt;(</a:t>
+            </a:r>
+            <a:r>
+              <a:rPr lang="en-US" sz="1100" b="1" spc="-1" dirty="0" err="1">
+                <a:solidFill>
+                  <a:srgbClr val="000000"/>
+                </a:solidFill>
+                <a:latin typeface="Courier New Bold"/>
+                <a:ea typeface="DejaVu Sans"/>
+              </a:rPr>
+              <a:t>szA</a:t>
+            </a:r>
+            <a:r>
+              <a:rPr lang="en-US" sz="1100" b="1" spc="-1" dirty="0">
+                <a:solidFill>
+                  <a:srgbClr val="000000"/>
+                </a:solidFill>
+                <a:latin typeface="Courier New Bold"/>
+                <a:ea typeface="DejaVu Sans"/>
+              </a:rPr>
+              <a:t>);</a:t>
+            </a:r>
+            <a:endParaRPr lang="en-US" sz="1100" spc="-1" dirty="0">
               <a:latin typeface="Arial"/>
             </a:endParaRPr>
           </a:p>
@@ -9342,16 +9927,56 @@
               </a:lnSpc>
             </a:pPr>
             <a:r>
-              <a:rPr lang="en-US" sz="1100" b="1" spc="-1">
-                <a:solidFill>
-                  <a:srgbClr val="000000"/>
-                </a:solidFill>
-                <a:latin typeface="Courier New Bold"/>
-                <a:ea typeface="DejaVu Sans"/>
-              </a:rPr>
-              <a:t>  h_B   = std::vector&lt;float&gt;(szB);</a:t>
-            </a:r>
-            <a:endParaRPr lang="en-US" sz="1100" spc="-1">
+              <a:rPr lang="en-US" sz="1100" b="1" spc="-1" dirty="0">
+                <a:solidFill>
+                  <a:srgbClr val="000000"/>
+                </a:solidFill>
+                <a:latin typeface="Courier New Bold"/>
+                <a:ea typeface="DejaVu Sans"/>
+              </a:rPr>
+              <a:t>  </a:t>
+            </a:r>
+            <a:r>
+              <a:rPr lang="en-US" sz="1100" b="1" spc="-1" dirty="0" err="1">
+                <a:solidFill>
+                  <a:srgbClr val="000000"/>
+                </a:solidFill>
+                <a:latin typeface="Courier New Bold"/>
+                <a:ea typeface="DejaVu Sans"/>
+              </a:rPr>
+              <a:t>h_B</a:t>
+            </a:r>
+            <a:r>
+              <a:rPr lang="en-US" sz="1100" b="1" spc="-1" dirty="0">
+                <a:solidFill>
+                  <a:srgbClr val="000000"/>
+                </a:solidFill>
+                <a:latin typeface="Courier New Bold"/>
+                <a:ea typeface="DejaVu Sans"/>
+              </a:rPr>
+              <a:t>   = std::vector&lt;float&gt;(</a:t>
+            </a:r>
+            <a:r>
+              <a:rPr lang="en-US" sz="1100" b="1" spc="-1" dirty="0" err="1">
+                <a:solidFill>
+                  <a:srgbClr val="000000"/>
+                </a:solidFill>
+                <a:latin typeface="Courier New Bold"/>
+                <a:ea typeface="DejaVu Sans"/>
+              </a:rPr>
+              <a:t>szB</a:t>
+            </a:r>
+            <a:r>
+              <a:rPr lang="en-US" sz="1100" b="1" spc="-1" dirty="0">
+                <a:solidFill>
+                  <a:srgbClr val="000000"/>
+                </a:solidFill>
+                <a:latin typeface="Courier New Bold"/>
+                <a:ea typeface="DejaVu Sans"/>
+              </a:rPr>
+              <a:t>);</a:t>
+            </a:r>
+            <a:endParaRPr lang="en-US" sz="1100" spc="-1" dirty="0">
               <a:latin typeface="Arial"/>
             </a:endParaRPr>
           </a:p>
@@ -9362,16 +9987,56 @@
               </a:lnSpc>
             </a:pPr>
             <a:r>
-              <a:rPr lang="en-US" sz="1100" b="1" spc="-1">
-                <a:solidFill>
-                  <a:srgbClr val="000000"/>
-                </a:solidFill>
-                <a:latin typeface="Courier New Bold"/>
-                <a:ea typeface="DejaVu Sans"/>
-              </a:rPr>
-              <a:t>  h_C   = std::vector&lt;float&gt;(szC);</a:t>
-            </a:r>
-            <a:endParaRPr lang="en-US" sz="1100" spc="-1">
+              <a:rPr lang="en-US" sz="1100" b="1" spc="-1" dirty="0">
+                <a:solidFill>
+                  <a:srgbClr val="000000"/>
+                </a:solidFill>
+                <a:latin typeface="Courier New Bold"/>
+                <a:ea typeface="DejaVu Sans"/>
+              </a:rPr>
+              <a:t>  </a:t>
+            </a:r>
+            <a:r>
+              <a:rPr lang="en-US" sz="1100" b="1" spc="-1" dirty="0" err="1">
+                <a:solidFill>
+                  <a:srgbClr val="000000"/>
+                </a:solidFill>
+                <a:latin typeface="Courier New Bold"/>
+                <a:ea typeface="DejaVu Sans"/>
+              </a:rPr>
+              <a:t>h_C</a:t>
+            </a:r>
+            <a:r>
+              <a:rPr lang="en-US" sz="1100" b="1" spc="-1" dirty="0">
+                <a:solidFill>
+                  <a:srgbClr val="000000"/>
+                </a:solidFill>
+                <a:latin typeface="Courier New Bold"/>
+                <a:ea typeface="DejaVu Sans"/>
+              </a:rPr>
+              <a:t>   = std::vector&lt;float&gt;(</a:t>
+            </a:r>
+            <a:r>
+              <a:rPr lang="en-US" sz="1100" b="1" spc="-1" dirty="0" err="1">
+                <a:solidFill>
+                  <a:srgbClr val="000000"/>
+                </a:solidFill>
+                <a:latin typeface="Courier New Bold"/>
+                <a:ea typeface="DejaVu Sans"/>
+              </a:rPr>
+              <a:t>szC</a:t>
+            </a:r>
+            <a:r>
+              <a:rPr lang="en-US" sz="1100" b="1" spc="-1" dirty="0">
+                <a:solidFill>
+                  <a:srgbClr val="000000"/>
+                </a:solidFill>
+                <a:latin typeface="Courier New Bold"/>
+                <a:ea typeface="DejaVu Sans"/>
+              </a:rPr>
+              <a:t>);</a:t>
+            </a:r>
+            <a:endParaRPr lang="en-US" sz="1100" spc="-1" dirty="0">
               <a:latin typeface="Arial"/>
             </a:endParaRPr>
           </a:p>
@@ -9381,7 +10046,7 @@
                 <a:spcPct val="100000"/>
               </a:lnSpc>
             </a:pPr>
-            <a:endParaRPr lang="en-US" sz="1100" spc="-1">
+            <a:endParaRPr lang="en-US" sz="1100" spc="-1" dirty="0">
               <a:latin typeface="Arial"/>
             </a:endParaRPr>
           </a:p>
@@ -9392,16 +10057,156 @@
               </a:lnSpc>
             </a:pPr>
             <a:r>
-              <a:rPr lang="en-US" sz="1100" b="1" spc="-1">
-                <a:solidFill>
-                  <a:srgbClr val="000000"/>
-                </a:solidFill>
-                <a:latin typeface="Courier New Bold"/>
-                <a:ea typeface="DejaVu Sans"/>
-              </a:rPr>
-              <a:t>  initmat(Mdim, Ndim, Pdim, h_A, h_B, h_C);</a:t>
-            </a:r>
-            <a:endParaRPr lang="en-US" sz="1100" spc="-1">
+              <a:rPr lang="en-US" sz="1100" b="1" spc="-1" dirty="0">
+                <a:solidFill>
+                  <a:srgbClr val="000000"/>
+                </a:solidFill>
+                <a:latin typeface="Courier New Bold"/>
+                <a:ea typeface="DejaVu Sans"/>
+              </a:rPr>
+              <a:t>  </a:t>
+            </a:r>
+            <a:r>
+              <a:rPr lang="en-US" sz="1100" b="1" spc="-1" dirty="0" err="1">
+                <a:solidFill>
+                  <a:srgbClr val="000000"/>
+                </a:solidFill>
+                <a:latin typeface="Courier New Bold"/>
+                <a:ea typeface="DejaVu Sans"/>
+              </a:rPr>
+              <a:t>initmat</a:t>
+            </a:r>
+            <a:r>
+              <a:rPr lang="en-US" sz="1100" b="1" spc="-1" dirty="0">
+                <a:solidFill>
+                  <a:srgbClr val="000000"/>
+                </a:solidFill>
+                <a:latin typeface="Courier New Bold"/>
+                <a:ea typeface="DejaVu Sans"/>
+              </a:rPr>
+              <a:t>(</a:t>
+            </a:r>
+            <a:r>
+              <a:rPr lang="en-US" sz="1100" b="1" spc="-1" dirty="0" err="1">
+                <a:solidFill>
+                  <a:srgbClr val="000000"/>
+                </a:solidFill>
+                <a:latin typeface="Courier New Bold"/>
+                <a:ea typeface="DejaVu Sans"/>
+              </a:rPr>
+              <a:t>Mdim</a:t>
+            </a:r>
+            <a:r>
+              <a:rPr lang="en-US" sz="1100" b="1" spc="-1" dirty="0">
+                <a:solidFill>
+                  <a:srgbClr val="000000"/>
+                </a:solidFill>
+                <a:latin typeface="Courier New Bold"/>
+                <a:ea typeface="DejaVu Sans"/>
+              </a:rPr>
+              <a:t>, </a:t>
+            </a:r>
+            <a:r>
+              <a:rPr lang="en-US" sz="1100" b="1" spc="-1" dirty="0" err="1">
+                <a:solidFill>
+                  <a:srgbClr val="000000"/>
+                </a:solidFill>
+                <a:latin typeface="Courier New Bold"/>
+                <a:ea typeface="DejaVu Sans"/>
+              </a:rPr>
+              <a:t>Ndim</a:t>
+            </a:r>
+            <a:r>
+              <a:rPr lang="en-US" sz="1100" b="1" spc="-1" dirty="0">
+                <a:solidFill>
+                  <a:srgbClr val="000000"/>
+                </a:solidFill>
+                <a:latin typeface="Courier New Bold"/>
+                <a:ea typeface="DejaVu Sans"/>
+              </a:rPr>
+              <a:t>, </a:t>
+            </a:r>
+            <a:r>
+              <a:rPr lang="en-US" sz="1100" b="1" spc="-1" dirty="0" err="1">
+                <a:solidFill>
+                  <a:srgbClr val="000000"/>
+                </a:solidFill>
+                <a:latin typeface="Courier New Bold"/>
+                <a:ea typeface="DejaVu Sans"/>
+              </a:rPr>
+              <a:t>Pdim</a:t>
+            </a:r>
+            <a:r>
+              <a:rPr lang="en-US" sz="1100" b="1" spc="-1" dirty="0">
+                <a:solidFill>
+                  <a:srgbClr val="000000"/>
+                </a:solidFill>
+                <a:latin typeface="Courier New Bold"/>
+                <a:ea typeface="DejaVu Sans"/>
+              </a:rPr>
+              <a:t>, </a:t>
+            </a:r>
+            <a:r>
+              <a:rPr lang="en-US" sz="1100" b="1" spc="-1" dirty="0" err="1">
+                <a:solidFill>
+                  <a:srgbClr val="000000"/>
+                </a:solidFill>
+                <a:latin typeface="Courier New Bold"/>
+                <a:ea typeface="DejaVu Sans"/>
+              </a:rPr>
+              <a:t>h_A</a:t>
+            </a:r>
+            <a:r>
+              <a:rPr lang="en-US" sz="1100" b="1" spc="-1" dirty="0">
+                <a:solidFill>
+                  <a:srgbClr val="000000"/>
+                </a:solidFill>
+                <a:latin typeface="Courier New Bold"/>
+                <a:ea typeface="DejaVu Sans"/>
+              </a:rPr>
+              <a:t>, </a:t>
+            </a:r>
+            <a:r>
+              <a:rPr lang="en-US" sz="1100" b="1" spc="-1" dirty="0" err="1">
+                <a:solidFill>
+                  <a:srgbClr val="000000"/>
+                </a:solidFill>
+                <a:latin typeface="Courier New Bold"/>
+                <a:ea typeface="DejaVu Sans"/>
+              </a:rPr>
+              <a:t>h_B</a:t>
+            </a:r>
+            <a:r>
+              <a:rPr lang="en-US" sz="1100" b="1" spc="-1" dirty="0">
+                <a:solidFill>
+                  <a:srgbClr val="000000"/>
+                </a:solidFill>
+                <a:latin typeface="Courier New Bold"/>
+                <a:ea typeface="DejaVu Sans"/>
+              </a:rPr>
+              <a:t>, </a:t>
+            </a:r>
+            <a:r>
+              <a:rPr lang="en-US" sz="1100" b="1" spc="-1" dirty="0" err="1">
+                <a:solidFill>
+                  <a:srgbClr val="000000"/>
+                </a:solidFill>
+                <a:latin typeface="Courier New Bold"/>
+                <a:ea typeface="DejaVu Sans"/>
+              </a:rPr>
+              <a:t>h_C</a:t>
+            </a:r>
+            <a:r>
+              <a:rPr lang="en-US" sz="1100" b="1" spc="-1" dirty="0">
+                <a:solidFill>
+                  <a:srgbClr val="000000"/>
+                </a:solidFill>
+                <a:latin typeface="Courier New Bold"/>
+                <a:ea typeface="DejaVu Sans"/>
+              </a:rPr>
+              <a:t>);</a:t>
+            </a:r>
+            <a:endParaRPr lang="en-US" sz="1100" spc="-1" dirty="0">
               <a:latin typeface="Arial"/>
             </a:endParaRPr>
           </a:p>
@@ -9411,7 +10216,7 @@
                 <a:spcPct val="100000"/>
               </a:lnSpc>
             </a:pPr>
-            <a:endParaRPr lang="en-US" sz="1100" spc="-1">
+            <a:endParaRPr lang="en-US" sz="1100" spc="-1" dirty="0">
               <a:latin typeface="Arial"/>
             </a:endParaRPr>
           </a:p>
@@ -9422,7 +10227,7 @@
               </a:lnSpc>
             </a:pPr>
             <a:r>
-              <a:rPr lang="en-US" sz="1100" b="1" spc="-1">
+              <a:rPr lang="en-US" sz="1100" b="1" spc="-1" dirty="0">
                 <a:solidFill>
                   <a:srgbClr val="000000"/>
                 </a:solidFill>
@@ -9431,7 +10236,7 @@
               </a:rPr>
               <a:t>  // Compile for first kernel to setup program</a:t>
             </a:r>
-            <a:endParaRPr lang="en-US" sz="1100" spc="-1">
+            <a:endParaRPr lang="en-US" sz="1100" spc="-1" dirty="0">
               <a:latin typeface="Arial"/>
             </a:endParaRPr>
           </a:p>
@@ -9442,16 +10247,36 @@
               </a:lnSpc>
             </a:pPr>
             <a:r>
-              <a:rPr lang="en-US" sz="1100" b="1" spc="-1">
-                <a:solidFill>
-                  <a:srgbClr val="000000"/>
-                </a:solidFill>
-                <a:latin typeface="Courier New Bold"/>
-                <a:ea typeface="DejaVu Sans"/>
-              </a:rPr>
-              <a:t>  program = cl::Program(C_elem_KernelSource, true);</a:t>
-            </a:r>
-            <a:endParaRPr lang="en-US" sz="1100" spc="-1">
+              <a:rPr lang="en-US" sz="1100" b="1" spc="-1" dirty="0">
+                <a:solidFill>
+                  <a:srgbClr val="000000"/>
+                </a:solidFill>
+                <a:latin typeface="Courier New Bold"/>
+                <a:ea typeface="DejaVu Sans"/>
+              </a:rPr>
+              <a:t>  program = cl::Program(</a:t>
+            </a:r>
+            <a:r>
+              <a:rPr lang="en-US" sz="1100" b="1" spc="-1" dirty="0" err="1">
+                <a:solidFill>
+                  <a:srgbClr val="000000"/>
+                </a:solidFill>
+                <a:latin typeface="Courier New Bold"/>
+                <a:ea typeface="DejaVu Sans"/>
+              </a:rPr>
+              <a:t>C_elem_KernelSource</a:t>
+            </a:r>
+            <a:r>
+              <a:rPr lang="en-US" sz="1100" b="1" spc="-1" dirty="0">
+                <a:solidFill>
+                  <a:srgbClr val="000000"/>
+                </a:solidFill>
+                <a:latin typeface="Courier New Bold"/>
+                <a:ea typeface="DejaVu Sans"/>
+              </a:rPr>
+              <a:t>, true);</a:t>
+            </a:r>
+            <a:endParaRPr lang="en-US" sz="1100" spc="-1" dirty="0">
               <a:latin typeface="Arial"/>
             </a:endParaRPr>
           </a:p>
@@ -9462,7 +10287,7 @@
               </a:lnSpc>
             </a:pPr>
             <a:r>
-              <a:rPr lang="en-US" sz="1100" b="1" spc="-1">
+              <a:rPr lang="en-US" sz="1100" b="1" spc="-1" dirty="0">
                 <a:solidFill>
                   <a:srgbClr val="000000"/>
                 </a:solidFill>
@@ -9471,7 +10296,7 @@
               </a:rPr>
               <a:t>  Context context(CL_DEVICE_TYPE_DEFAULT);  </a:t>
             </a:r>
-            <a:endParaRPr lang="en-US" sz="1100" spc="-1">
+            <a:endParaRPr lang="en-US" sz="1100" spc="-1" dirty="0">
               <a:latin typeface="Arial"/>
             </a:endParaRPr>
           </a:p>
@@ -9482,16 +10307,36 @@
               </a:lnSpc>
             </a:pPr>
             <a:r>
-              <a:rPr lang="en-US" sz="1100" b="1" spc="-1">
-                <a:solidFill>
-                  <a:srgbClr val="000000"/>
-                </a:solidFill>
-                <a:latin typeface="Courier New Bold"/>
-                <a:ea typeface="DejaVu Sans"/>
-              </a:rPr>
-              <a:t>  cl::CommandQueue queue(context);</a:t>
-            </a:r>
-            <a:endParaRPr lang="en-US" sz="1100" spc="-1">
+              <a:rPr lang="en-US" sz="1100" b="1" spc="-1" dirty="0">
+                <a:solidFill>
+                  <a:srgbClr val="000000"/>
+                </a:solidFill>
+                <a:latin typeface="Courier New Bold"/>
+                <a:ea typeface="DejaVu Sans"/>
+              </a:rPr>
+              <a:t>  cl::</a:t>
+            </a:r>
+            <a:r>
+              <a:rPr lang="en-US" sz="1100" b="1" spc="-1" dirty="0" err="1">
+                <a:solidFill>
+                  <a:srgbClr val="000000"/>
+                </a:solidFill>
+                <a:latin typeface="Courier New Bold"/>
+                <a:ea typeface="DejaVu Sans"/>
+              </a:rPr>
+              <a:t>CommandQueue</a:t>
+            </a:r>
+            <a:r>
+              <a:rPr lang="en-US" sz="1100" b="1" spc="-1" dirty="0">
+                <a:solidFill>
+                  <a:srgbClr val="000000"/>
+                </a:solidFill>
+                <a:latin typeface="Courier New Bold"/>
+                <a:ea typeface="DejaVu Sans"/>
+              </a:rPr>
+              <a:t> queue(context);</a:t>
+            </a:r>
+            <a:endParaRPr lang="en-US" sz="1100" spc="-1" dirty="0">
               <a:latin typeface="Arial"/>
             </a:endParaRPr>
           </a:p>
@@ -9502,7 +10347,7 @@
               </a:lnSpc>
             </a:pPr>
             <a:r>
-              <a:rPr lang="en-US" sz="1100" b="1" spc="-1">
+              <a:rPr lang="en-US" sz="1100" b="1" spc="-1" dirty="0">
                 <a:solidFill>
                   <a:srgbClr val="000000"/>
                 </a:solidFill>
@@ -9511,7 +10356,7 @@
               </a:rPr>
               <a:t>  std::vector&lt;Device&gt; devices =</a:t>
             </a:r>
-            <a:endParaRPr lang="en-US" sz="1100" spc="-1">
+            <a:endParaRPr lang="en-US" sz="1100" spc="-1" dirty="0">
               <a:latin typeface="Arial"/>
             </a:endParaRPr>
           </a:p>
@@ -9522,16 +10367,36 @@
               </a:lnSpc>
             </a:pPr>
             <a:r>
-              <a:rPr lang="en-US" sz="1100" b="1" spc="-1">
-                <a:solidFill>
-                  <a:srgbClr val="000000"/>
-                </a:solidFill>
-                <a:latin typeface="Courier New Bold"/>
-                <a:ea typeface="DejaVu Sans"/>
-              </a:rPr>
-              <a:t>      context.getInfo&lt;CL_CONTEXT_DEVICES&gt;();</a:t>
-            </a:r>
-            <a:endParaRPr lang="en-US" sz="1100" spc="-1">
+              <a:rPr lang="en-US" sz="1100" b="1" spc="-1" dirty="0">
+                <a:solidFill>
+                  <a:srgbClr val="000000"/>
+                </a:solidFill>
+                <a:latin typeface="Courier New Bold"/>
+                <a:ea typeface="DejaVu Sans"/>
+              </a:rPr>
+              <a:t>      </a:t>
+            </a:r>
+            <a:r>
+              <a:rPr lang="en-US" sz="1100" b="1" spc="-1" dirty="0" err="1">
+                <a:solidFill>
+                  <a:srgbClr val="000000"/>
+                </a:solidFill>
+                <a:latin typeface="Courier New Bold"/>
+                <a:ea typeface="DejaVu Sans"/>
+              </a:rPr>
+              <a:t>context.getInfo</a:t>
+            </a:r>
+            <a:r>
+              <a:rPr lang="en-US" sz="1100" b="1" spc="-1" dirty="0">
+                <a:solidFill>
+                  <a:srgbClr val="000000"/>
+                </a:solidFill>
+                <a:latin typeface="Courier New Bold"/>
+                <a:ea typeface="DejaVu Sans"/>
+              </a:rPr>
+              <a:t>&lt;CL_CONTEXT_DEVICES&gt;();</a:t>
+            </a:r>
+            <a:endParaRPr lang="en-US" sz="1100" spc="-1" dirty="0">
               <a:latin typeface="Arial"/>
             </a:endParaRPr>
           </a:p>
@@ -9542,16 +10407,36 @@
               </a:lnSpc>
             </a:pPr>
             <a:r>
-              <a:rPr lang="en-US" sz="1100" b="1" spc="-1">
-                <a:solidFill>
-                  <a:srgbClr val="000000"/>
-                </a:solidFill>
-                <a:latin typeface="Courier New Bold"/>
-                <a:ea typeface="DejaVu Sans"/>
-              </a:rPr>
-              <a:t>  cl::Device device = devices[0]; </a:t>
-            </a:r>
-            <a:endParaRPr lang="en-US" sz="1100" spc="-1">
+              <a:rPr lang="en-US" sz="1100" b="1" spc="-1" dirty="0">
+                <a:solidFill>
+                  <a:srgbClr val="000000"/>
+                </a:solidFill>
+                <a:latin typeface="Courier New Bold"/>
+                <a:ea typeface="DejaVu Sans"/>
+              </a:rPr>
+              <a:t>  cl::Device </a:t>
+            </a:r>
+            <a:r>
+              <a:rPr lang="en-US" sz="1100" b="1" spc="-1" dirty="0" err="1">
+                <a:solidFill>
+                  <a:srgbClr val="000000"/>
+                </a:solidFill>
+                <a:latin typeface="Courier New Bold"/>
+                <a:ea typeface="DejaVu Sans"/>
+              </a:rPr>
+              <a:t>device</a:t>
+            </a:r>
+            <a:r>
+              <a:rPr lang="en-US" sz="1100" b="1" spc="-1" dirty="0">
+                <a:solidFill>
+                  <a:srgbClr val="000000"/>
+                </a:solidFill>
+                <a:latin typeface="Courier New Bold"/>
+                <a:ea typeface="DejaVu Sans"/>
+              </a:rPr>
+              <a:t> = devices[0]; </a:t>
+            </a:r>
+            <a:endParaRPr lang="en-US" sz="1100" spc="-1" dirty="0">
               <a:latin typeface="Arial"/>
             </a:endParaRPr>
           </a:p>
@@ -9562,7 +10447,7 @@
               </a:lnSpc>
             </a:pPr>
             <a:r>
-              <a:rPr lang="en-US" sz="1100" b="1" spc="-1">
+              <a:rPr lang="en-US" sz="1100" b="1" spc="-1" dirty="0">
                 <a:solidFill>
                   <a:srgbClr val="000000"/>
                 </a:solidFill>
@@ -9571,7 +10456,7 @@
               </a:rPr>
               <a:t>  std::string s =  </a:t>
             </a:r>
-            <a:endParaRPr lang="en-US" sz="1100" spc="-1">
+            <a:endParaRPr lang="en-US" sz="1100" spc="-1" dirty="0">
               <a:latin typeface="Arial"/>
             </a:endParaRPr>
           </a:p>
@@ -9582,16 +10467,36 @@
               </a:lnSpc>
             </a:pPr>
             <a:r>
-              <a:rPr lang="en-US" sz="1100" b="1" spc="-1">
-                <a:solidFill>
-                  <a:srgbClr val="000000"/>
-                </a:solidFill>
-                <a:latin typeface="Courier New Bold"/>
-                <a:ea typeface="DejaVu Sans"/>
-              </a:rPr>
-              <a:t>      device.getInfo&lt;CL_DEVICE_NAME&gt;();</a:t>
-            </a:r>
-            <a:endParaRPr lang="en-US" sz="1100" spc="-1">
+              <a:rPr lang="en-US" sz="1100" b="1" spc="-1" dirty="0">
+                <a:solidFill>
+                  <a:srgbClr val="000000"/>
+                </a:solidFill>
+                <a:latin typeface="Courier New Bold"/>
+                <a:ea typeface="DejaVu Sans"/>
+              </a:rPr>
+              <a:t>      </a:t>
+            </a:r>
+            <a:r>
+              <a:rPr lang="en-US" sz="1100" b="1" spc="-1" dirty="0" err="1">
+                <a:solidFill>
+                  <a:srgbClr val="000000"/>
+                </a:solidFill>
+                <a:latin typeface="Courier New Bold"/>
+                <a:ea typeface="DejaVu Sans"/>
+              </a:rPr>
+              <a:t>device.getInfo</a:t>
+            </a:r>
+            <a:r>
+              <a:rPr lang="en-US" sz="1100" b="1" spc="-1" dirty="0">
+                <a:solidFill>
+                  <a:srgbClr val="000000"/>
+                </a:solidFill>
+                <a:latin typeface="Courier New Bold"/>
+                <a:ea typeface="DejaVu Sans"/>
+              </a:rPr>
+              <a:t>&lt;CL_DEVICE_NAME&gt;();</a:t>
+            </a:r>
+            <a:endParaRPr lang="en-US" sz="1100" spc="-1" dirty="0">
               <a:latin typeface="Arial"/>
             </a:endParaRPr>
           </a:p>
@@ -9602,16 +10507,56 @@
               </a:lnSpc>
             </a:pPr>
             <a:r>
-              <a:rPr lang="en-US" sz="1100" b="1" spc="-1">
-                <a:solidFill>
-                  <a:srgbClr val="000000"/>
-                </a:solidFill>
-                <a:latin typeface="Courier New Bold"/>
-                <a:ea typeface="DejaVu Sans"/>
-              </a:rPr>
-              <a:t>  std::cout &lt;&lt; "\nUsing OpenCL Device ”</a:t>
-            </a:r>
-            <a:endParaRPr lang="en-US" sz="1100" spc="-1">
+              <a:rPr lang="en-US" sz="1100" b="1" spc="-1" dirty="0">
+                <a:solidFill>
+                  <a:srgbClr val="000000"/>
+                </a:solidFill>
+                <a:latin typeface="Courier New Bold"/>
+                <a:ea typeface="DejaVu Sans"/>
+              </a:rPr>
+              <a:t>  std::</a:t>
+            </a:r>
+            <a:r>
+              <a:rPr lang="en-US" sz="1100" b="1" spc="-1" dirty="0" err="1">
+                <a:solidFill>
+                  <a:srgbClr val="000000"/>
+                </a:solidFill>
+                <a:latin typeface="Courier New Bold"/>
+                <a:ea typeface="DejaVu Sans"/>
+              </a:rPr>
+              <a:t>cout</a:t>
+            </a:r>
+            <a:r>
+              <a:rPr lang="en-US" sz="1100" b="1" spc="-1" dirty="0">
+                <a:solidFill>
+                  <a:srgbClr val="000000"/>
+                </a:solidFill>
+                <a:latin typeface="Courier New Bold"/>
+                <a:ea typeface="DejaVu Sans"/>
+              </a:rPr>
+              <a:t> &lt;&lt; "\</a:t>
+            </a:r>
+            <a:r>
+              <a:rPr lang="en-US" sz="1100" b="1" spc="-1" dirty="0" err="1">
+                <a:solidFill>
+                  <a:srgbClr val="000000"/>
+                </a:solidFill>
+                <a:latin typeface="Courier New Bold"/>
+                <a:ea typeface="DejaVu Sans"/>
+              </a:rPr>
+              <a:t>nUsing</a:t>
+            </a:r>
+            <a:r>
+              <a:rPr lang="en-US" sz="1100" b="1" spc="-1" dirty="0">
+                <a:solidFill>
+                  <a:srgbClr val="000000"/>
+                </a:solidFill>
+                <a:latin typeface="Courier New Bold"/>
+                <a:ea typeface="DejaVu Sans"/>
+              </a:rPr>
+              <a:t> OpenCL Device“</a:t>
+            </a:r>
+            <a:endParaRPr lang="en-US" sz="1100" spc="-1" dirty="0">
               <a:latin typeface="Arial"/>
             </a:endParaRPr>
           </a:p>
@@ -9622,7 +10567,7 @@
               </a:lnSpc>
             </a:pPr>
             <a:r>
-              <a:rPr lang="en-US" sz="1100" b="1" spc="-1">
+              <a:rPr lang="en-US" sz="1100" b="1" spc="-1" dirty="0">
                 <a:solidFill>
                   <a:srgbClr val="000000"/>
                 </a:solidFill>
@@ -9631,7 +10576,7 @@
               </a:rPr>
               <a:t>            &lt;&lt; s &lt;&lt; "\n";</a:t>
             </a:r>
-            <a:endParaRPr lang="en-US" sz="1100" spc="-1">
+            <a:endParaRPr lang="en-US" sz="1100" spc="-1" dirty="0">
               <a:latin typeface="Arial"/>
             </a:endParaRPr>
           </a:p>

</xml_diff>